<commit_message>
Añadida Comunio Django App
</commit_message>
<xml_diff>
--- a/ML_Project.pptx
+++ b/ML_Project.pptx
@@ -12608,7 +12608,11 @@
           <a:p>
             <a:r>
               <a:rPr lang="es-ES" dirty="0"/>
-              <a:t>Comunio Helper</a:t>
+              <a:t>Comunio </a:t>
+            </a:r>
+            <a:r>
+              <a:rPr lang="es-ES" dirty="0" err="1"/>
+              <a:t>Assistant</a:t>
             </a:r>
             <a:br>
               <a:rPr lang="es-ES" dirty="0"/>
@@ -20741,6 +20745,96 @@
           </a:prstGeom>
         </p:spPr>
       </p:pic>
+      <p:pic>
+        <p:nvPicPr>
+          <p:cNvPr id="11" name="Imagen 10" descr="Texto&#10;&#10;Descripción generada automáticamente">
+            <a:extLst>
+              <a:ext uri="{FF2B5EF4-FFF2-40B4-BE49-F238E27FC236}">
+                <a16:creationId xmlns:a16="http://schemas.microsoft.com/office/drawing/2014/main" id="{1A1C93AE-F91E-DEAE-4521-E033FB61F087}"/>
+              </a:ext>
+            </a:extLst>
+          </p:cNvPr>
+          <p:cNvPicPr>
+            <a:picLocks noChangeAspect="1"/>
+          </p:cNvPicPr>
+          <p:nvPr/>
+        </p:nvPicPr>
+        <p:blipFill>
+          <a:blip r:embed="rId5"/>
+          <a:stretch>
+            <a:fillRect/>
+          </a:stretch>
+        </p:blipFill>
+        <p:spPr>
+          <a:xfrm>
+            <a:off x="5859891" y="546579"/>
+            <a:ext cx="2305372" cy="2410161"/>
+          </a:xfrm>
+          <a:prstGeom prst="rect">
+            <a:avLst/>
+          </a:prstGeom>
+        </p:spPr>
+      </p:pic>
+      <p:pic>
+        <p:nvPicPr>
+          <p:cNvPr id="13" name="Imagen 12" descr="Texto&#10;&#10;Descripción generada automáticamente">
+            <a:extLst>
+              <a:ext uri="{FF2B5EF4-FFF2-40B4-BE49-F238E27FC236}">
+                <a16:creationId xmlns:a16="http://schemas.microsoft.com/office/drawing/2014/main" id="{BD5B4E1E-A2AC-7733-E944-CBB767E8AB53}"/>
+              </a:ext>
+            </a:extLst>
+          </p:cNvPr>
+          <p:cNvPicPr>
+            <a:picLocks noChangeAspect="1"/>
+          </p:cNvPicPr>
+          <p:nvPr/>
+        </p:nvPicPr>
+        <p:blipFill>
+          <a:blip r:embed="rId6"/>
+          <a:stretch>
+            <a:fillRect/>
+          </a:stretch>
+        </p:blipFill>
+        <p:spPr>
+          <a:xfrm>
+            <a:off x="6644213" y="1336857"/>
+            <a:ext cx="2267266" cy="5344271"/>
+          </a:xfrm>
+          <a:prstGeom prst="rect">
+            <a:avLst/>
+          </a:prstGeom>
+        </p:spPr>
+      </p:pic>
+      <p:pic>
+        <p:nvPicPr>
+          <p:cNvPr id="4" name="Imagen 3" descr="Texto&#10;&#10;Descripción generada automáticamente con confianza baja">
+            <a:extLst>
+              <a:ext uri="{FF2B5EF4-FFF2-40B4-BE49-F238E27FC236}">
+                <a16:creationId xmlns:a16="http://schemas.microsoft.com/office/drawing/2014/main" id="{62740731-AFBA-2452-CFF8-CD4955AB657F}"/>
+              </a:ext>
+            </a:extLst>
+          </p:cNvPr>
+          <p:cNvPicPr>
+            <a:picLocks noChangeAspect="1"/>
+          </p:cNvPicPr>
+          <p:nvPr/>
+        </p:nvPicPr>
+        <p:blipFill>
+          <a:blip r:embed="rId7"/>
+          <a:stretch>
+            <a:fillRect/>
+          </a:stretch>
+        </p:blipFill>
+        <p:spPr>
+          <a:xfrm>
+            <a:off x="3050739" y="2424212"/>
+            <a:ext cx="2666097" cy="4256916"/>
+          </a:xfrm>
+          <a:prstGeom prst="rect">
+            <a:avLst/>
+          </a:prstGeom>
+        </p:spPr>
+      </p:pic>
     </p:spTree>
     <p:extLst>
       <p:ext uri="{BB962C8B-B14F-4D97-AF65-F5344CB8AC3E}">
@@ -20924,7 +21018,7 @@
                                           </p:stCondLst>
                                         </p:cTn>
                                         <p:tgtEl>
-                                          <p:spTgt spid="16"/>
+                                          <p:spTgt spid="4"/>
                                         </p:tgtEl>
                                         <p:attrNameLst>
                                           <p:attrName>style.visibility</p:attrName>
@@ -20956,7 +21050,7 @@
                             </p:stCondLst>
                             <p:childTnLst>
                               <p:par>
-                                <p:cTn id="21" presetID="1" presetClass="exit" presetSubtype="0" fill="hold" nodeType="clickEffect">
+                                <p:cTn id="21" presetID="1" presetClass="entr" presetSubtype="0" fill="hold" nodeType="clickEffect">
                                   <p:stCondLst>
                                     <p:cond delay="0"/>
                                   </p:stCondLst>
@@ -20964,6 +21058,202 @@
                                     <p:set>
                                       <p:cBhvr>
                                         <p:cTn id="22" dur="1" fill="hold">
+                                          <p:stCondLst>
+                                            <p:cond delay="0"/>
+                                          </p:stCondLst>
+                                        </p:cTn>
+                                        <p:tgtEl>
+                                          <p:spTgt spid="16"/>
+                                        </p:tgtEl>
+                                        <p:attrNameLst>
+                                          <p:attrName>style.visibility</p:attrName>
+                                        </p:attrNameLst>
+                                      </p:cBhvr>
+                                      <p:to>
+                                        <p:strVal val="visible"/>
+                                      </p:to>
+                                    </p:set>
+                                  </p:childTnLst>
+                                </p:cTn>
+                              </p:par>
+                            </p:childTnLst>
+                          </p:cTn>
+                        </p:par>
+                      </p:childTnLst>
+                    </p:cTn>
+                  </p:par>
+                  <p:par>
+                    <p:cTn id="23" fill="hold">
+                      <p:stCondLst>
+                        <p:cond delay="indefinite"/>
+                      </p:stCondLst>
+                      <p:childTnLst>
+                        <p:par>
+                          <p:cTn id="24" fill="hold">
+                            <p:stCondLst>
+                              <p:cond delay="0"/>
+                            </p:stCondLst>
+                            <p:childTnLst>
+                              <p:par>
+                                <p:cTn id="25" presetID="10" presetClass="exit" presetSubtype="0" fill="hold" nodeType="clickEffect">
+                                  <p:stCondLst>
+                                    <p:cond delay="0"/>
+                                  </p:stCondLst>
+                                  <p:childTnLst>
+                                    <p:animEffect transition="out" filter="fade">
+                                      <p:cBhvr>
+                                        <p:cTn id="26" dur="500"/>
+                                        <p:tgtEl>
+                                          <p:spTgt spid="4"/>
+                                        </p:tgtEl>
+                                      </p:cBhvr>
+                                    </p:animEffect>
+                                    <p:set>
+                                      <p:cBhvr>
+                                        <p:cTn id="27" dur="1" fill="hold">
+                                          <p:stCondLst>
+                                            <p:cond delay="499"/>
+                                          </p:stCondLst>
+                                        </p:cTn>
+                                        <p:tgtEl>
+                                          <p:spTgt spid="4"/>
+                                        </p:tgtEl>
+                                        <p:attrNameLst>
+                                          <p:attrName>style.visibility</p:attrName>
+                                        </p:attrNameLst>
+                                      </p:cBhvr>
+                                      <p:to>
+                                        <p:strVal val="hidden"/>
+                                      </p:to>
+                                    </p:set>
+                                  </p:childTnLst>
+                                </p:cTn>
+                              </p:par>
+                            </p:childTnLst>
+                          </p:cTn>
+                        </p:par>
+                      </p:childTnLst>
+                    </p:cTn>
+                  </p:par>
+                  <p:par>
+                    <p:cTn id="28" fill="hold">
+                      <p:stCondLst>
+                        <p:cond delay="indefinite"/>
+                      </p:stCondLst>
+                      <p:childTnLst>
+                        <p:par>
+                          <p:cTn id="29" fill="hold">
+                            <p:stCondLst>
+                              <p:cond delay="0"/>
+                            </p:stCondLst>
+                            <p:childTnLst>
+                              <p:par>
+                                <p:cTn id="30" presetID="10" presetClass="entr" presetSubtype="0" fill="hold" nodeType="clickEffect">
+                                  <p:stCondLst>
+                                    <p:cond delay="0"/>
+                                  </p:stCondLst>
+                                  <p:childTnLst>
+                                    <p:set>
+                                      <p:cBhvr>
+                                        <p:cTn id="31" dur="1" fill="hold">
+                                          <p:stCondLst>
+                                            <p:cond delay="0"/>
+                                          </p:stCondLst>
+                                        </p:cTn>
+                                        <p:tgtEl>
+                                          <p:spTgt spid="11"/>
+                                        </p:tgtEl>
+                                        <p:attrNameLst>
+                                          <p:attrName>style.visibility</p:attrName>
+                                        </p:attrNameLst>
+                                      </p:cBhvr>
+                                      <p:to>
+                                        <p:strVal val="visible"/>
+                                      </p:to>
+                                    </p:set>
+                                    <p:animEffect transition="in" filter="fade">
+                                      <p:cBhvr>
+                                        <p:cTn id="32" dur="500"/>
+                                        <p:tgtEl>
+                                          <p:spTgt spid="11"/>
+                                        </p:tgtEl>
+                                      </p:cBhvr>
+                                    </p:animEffect>
+                                  </p:childTnLst>
+                                </p:cTn>
+                              </p:par>
+                            </p:childTnLst>
+                          </p:cTn>
+                        </p:par>
+                      </p:childTnLst>
+                    </p:cTn>
+                  </p:par>
+                  <p:par>
+                    <p:cTn id="33" fill="hold">
+                      <p:stCondLst>
+                        <p:cond delay="indefinite"/>
+                      </p:stCondLst>
+                      <p:childTnLst>
+                        <p:par>
+                          <p:cTn id="34" fill="hold">
+                            <p:stCondLst>
+                              <p:cond delay="0"/>
+                            </p:stCondLst>
+                            <p:childTnLst>
+                              <p:par>
+                                <p:cTn id="35" presetID="1" presetClass="exit" presetSubtype="0" fill="hold" nodeType="clickEffect">
+                                  <p:stCondLst>
+                                    <p:cond delay="0"/>
+                                  </p:stCondLst>
+                                  <p:childTnLst>
+                                    <p:set>
+                                      <p:cBhvr>
+                                        <p:cTn id="36" dur="1" fill="hold">
+                                          <p:stCondLst>
+                                            <p:cond delay="0"/>
+                                          </p:stCondLst>
+                                        </p:cTn>
+                                        <p:tgtEl>
+                                          <p:spTgt spid="11"/>
+                                        </p:tgtEl>
+                                        <p:attrNameLst>
+                                          <p:attrName>style.visibility</p:attrName>
+                                        </p:attrNameLst>
+                                      </p:cBhvr>
+                                      <p:to>
+                                        <p:strVal val="hidden"/>
+                                      </p:to>
+                                    </p:set>
+                                  </p:childTnLst>
+                                </p:cTn>
+                              </p:par>
+                            </p:childTnLst>
+                          </p:cTn>
+                        </p:par>
+                      </p:childTnLst>
+                    </p:cTn>
+                  </p:par>
+                  <p:par>
+                    <p:cTn id="37" fill="hold">
+                      <p:stCondLst>
+                        <p:cond delay="indefinite"/>
+                      </p:stCondLst>
+                      <p:childTnLst>
+                        <p:par>
+                          <p:cTn id="38" fill="hold">
+                            <p:stCondLst>
+                              <p:cond delay="0"/>
+                            </p:stCondLst>
+                            <p:childTnLst>
+                              <p:par>
+                                <p:cTn id="39" presetID="1" presetClass="exit" presetSubtype="0" fill="hold" nodeType="clickEffect">
+                                  <p:stCondLst>
+                                    <p:cond delay="0"/>
+                                  </p:stCondLst>
+                                  <p:childTnLst>
+                                    <p:set>
+                                      <p:cBhvr>
+                                        <p:cTn id="40" dur="1" fill="hold">
                                           <p:stCondLst>
                                             <p:cond delay="0"/>
                                           </p:stCondLst>
@@ -20989,26 +21279,26 @@
                     </p:cTn>
                   </p:par>
                   <p:par>
-                    <p:cTn id="23" fill="hold">
+                    <p:cTn id="41" fill="hold">
                       <p:stCondLst>
                         <p:cond delay="indefinite"/>
                       </p:stCondLst>
                       <p:childTnLst>
                         <p:par>
-                          <p:cTn id="24" fill="hold">
+                          <p:cTn id="42" fill="hold">
                             <p:stCondLst>
                               <p:cond delay="0"/>
                             </p:stCondLst>
                             <p:childTnLst>
                               <p:par>
-                                <p:cTn id="25" presetID="1" presetClass="entr" presetSubtype="0" fill="hold" grpId="0" nodeType="clickEffect">
+                                <p:cTn id="43" presetID="1" presetClass="entr" presetSubtype="0" fill="hold" grpId="0" nodeType="clickEffect">
                                   <p:stCondLst>
                                     <p:cond delay="0"/>
                                   </p:stCondLst>
                                   <p:childTnLst>
                                     <p:set>
                                       <p:cBhvr>
-                                        <p:cTn id="26" dur="1" fill="hold">
+                                        <p:cTn id="44" dur="1" fill="hold">
                                           <p:stCondLst>
                                             <p:cond delay="0"/>
                                           </p:stCondLst>
@@ -21038,26 +21328,26 @@
                     </p:cTn>
                   </p:par>
                   <p:par>
-                    <p:cTn id="27" fill="hold">
+                    <p:cTn id="45" fill="hold">
                       <p:stCondLst>
                         <p:cond delay="indefinite"/>
                       </p:stCondLst>
                       <p:childTnLst>
                         <p:par>
-                          <p:cTn id="28" fill="hold">
+                          <p:cTn id="46" fill="hold">
                             <p:stCondLst>
                               <p:cond delay="0"/>
                             </p:stCondLst>
                             <p:childTnLst>
                               <p:par>
-                                <p:cTn id="29" presetID="1" presetClass="entr" presetSubtype="0" fill="hold" nodeType="clickEffect">
+                                <p:cTn id="47" presetID="1" presetClass="entr" presetSubtype="0" fill="hold" nodeType="clickEffect">
                                   <p:stCondLst>
                                     <p:cond delay="0"/>
                                   </p:stCondLst>
                                   <p:childTnLst>
                                     <p:set>
                                       <p:cBhvr>
-                                        <p:cTn id="30" dur="1" fill="hold">
+                                        <p:cTn id="48" dur="1" fill="hold">
                                           <p:stCondLst>
                                             <p:cond delay="0"/>
                                           </p:stCondLst>
@@ -21083,26 +21373,26 @@
                     </p:cTn>
                   </p:par>
                   <p:par>
-                    <p:cTn id="31" fill="hold">
+                    <p:cTn id="49" fill="hold">
                       <p:stCondLst>
                         <p:cond delay="indefinite"/>
                       </p:stCondLst>
                       <p:childTnLst>
                         <p:par>
-                          <p:cTn id="32" fill="hold">
+                          <p:cTn id="50" fill="hold">
                             <p:stCondLst>
                               <p:cond delay="0"/>
                             </p:stCondLst>
                             <p:childTnLst>
                               <p:par>
-                                <p:cTn id="33" presetID="1" presetClass="exit" presetSubtype="0" fill="hold" nodeType="clickEffect">
+                                <p:cTn id="51" presetID="1" presetClass="exit" presetSubtype="0" fill="hold" nodeType="clickEffect">
                                   <p:stCondLst>
                                     <p:cond delay="0"/>
                                   </p:stCondLst>
                                   <p:childTnLst>
                                     <p:set>
                                       <p:cBhvr>
-                                        <p:cTn id="34" dur="1" fill="hold">
+                                        <p:cTn id="52" dur="1" fill="hold">
                                           <p:stCondLst>
                                             <p:cond delay="0"/>
                                           </p:stCondLst>
@@ -21128,26 +21418,26 @@
                     </p:cTn>
                   </p:par>
                   <p:par>
-                    <p:cTn id="35" fill="hold">
+                    <p:cTn id="53" fill="hold">
                       <p:stCondLst>
                         <p:cond delay="indefinite"/>
                       </p:stCondLst>
                       <p:childTnLst>
                         <p:par>
-                          <p:cTn id="36" fill="hold">
+                          <p:cTn id="54" fill="hold">
                             <p:stCondLst>
                               <p:cond delay="0"/>
                             </p:stCondLst>
                             <p:childTnLst>
                               <p:par>
-                                <p:cTn id="37" presetID="1" presetClass="entr" presetSubtype="0" fill="hold" grpId="0" nodeType="clickEffect">
+                                <p:cTn id="55" presetID="1" presetClass="entr" presetSubtype="0" fill="hold" grpId="0" nodeType="clickEffect">
                                   <p:stCondLst>
                                     <p:cond delay="0"/>
                                   </p:stCondLst>
                                   <p:childTnLst>
                                     <p:set>
                                       <p:cBhvr>
-                                        <p:cTn id="38" dur="1" fill="hold">
+                                        <p:cTn id="56" dur="1" fill="hold">
                                           <p:stCondLst>
                                             <p:cond delay="0"/>
                                           </p:stCondLst>
@@ -21158,6 +21448,51 @@
                                               <p:pRg st="0" end="0"/>
                                             </p:txEl>
                                           </p:spTgt>
+                                        </p:tgtEl>
+                                        <p:attrNameLst>
+                                          <p:attrName>style.visibility</p:attrName>
+                                        </p:attrNameLst>
+                                      </p:cBhvr>
+                                      <p:to>
+                                        <p:strVal val="visible"/>
+                                      </p:to>
+                                    </p:set>
+                                  </p:childTnLst>
+                                </p:cTn>
+                              </p:par>
+                            </p:childTnLst>
+                          </p:cTn>
+                        </p:par>
+                      </p:childTnLst>
+                    </p:cTn>
+                  </p:par>
+                  <p:par>
+                    <p:cTn id="57" fill="hold">
+                      <p:stCondLst>
+                        <p:cond delay="indefinite"/>
+                      </p:stCondLst>
+                      <p:childTnLst>
+                        <p:par>
+                          <p:cTn id="58" fill="hold">
+                            <p:stCondLst>
+                              <p:cond delay="0"/>
+                            </p:stCondLst>
+                            <p:childTnLst>
+                              <p:par>
+                                <p:cTn id="59" presetID="1" presetClass="entr" presetSubtype="0" fill="hold" nodeType="clickEffect">
+                                  <p:stCondLst>
+                                    <p:cond delay="0"/>
+                                  </p:stCondLst>
+                                  <p:childTnLst>
+                                    <p:set>
+                                      <p:cBhvr>
+                                        <p:cTn id="60" dur="1" fill="hold">
+                                          <p:stCondLst>
+                                            <p:cond delay="0"/>
+                                          </p:stCondLst>
+                                        </p:cTn>
+                                        <p:tgtEl>
+                                          <p:spTgt spid="13"/>
                                         </p:tgtEl>
                                         <p:attrNameLst>
                                           <p:attrName>style.visibility</p:attrName>
@@ -22296,6 +22631,36 @@
           <a:chExt cx="0" cy="0"/>
         </a:xfrm>
       </p:grpSpPr>
+      <p:pic>
+        <p:nvPicPr>
+          <p:cNvPr id="16" name="Imagen 15" descr="Gráfico, Gráfico de superficie&#10;&#10;Descripción generada automáticamente">
+            <a:extLst>
+              <a:ext uri="{FF2B5EF4-FFF2-40B4-BE49-F238E27FC236}">
+                <a16:creationId xmlns:a16="http://schemas.microsoft.com/office/drawing/2014/main" id="{7B05938E-83F4-4567-8A0F-6F1F833852EB}"/>
+              </a:ext>
+            </a:extLst>
+          </p:cNvPr>
+          <p:cNvPicPr>
+            <a:picLocks noChangeAspect="1"/>
+          </p:cNvPicPr>
+          <p:nvPr/>
+        </p:nvPicPr>
+        <p:blipFill>
+          <a:blip r:embed="rId2"/>
+          <a:stretch>
+            <a:fillRect/>
+          </a:stretch>
+        </p:blipFill>
+        <p:spPr>
+          <a:xfrm>
+            <a:off x="6662057" y="4508046"/>
+            <a:ext cx="4191000" cy="3181350"/>
+          </a:xfrm>
+          <a:prstGeom prst="rect">
+            <a:avLst/>
+          </a:prstGeom>
+        </p:spPr>
+      </p:pic>
       <p:sp>
         <p:nvSpPr>
           <p:cNvPr id="2" name="Marcador de texto 1">
@@ -22406,7 +22771,7 @@
           <p:nvPr/>
         </p:nvPicPr>
         <p:blipFill>
-          <a:blip r:embed="rId2"/>
+          <a:blip r:embed="rId3"/>
           <a:stretch>
             <a:fillRect/>
           </a:stretch>
@@ -22436,14 +22801,14 @@
           <p:nvPr/>
         </p:nvPicPr>
         <p:blipFill>
-          <a:blip r:embed="rId3"/>
+          <a:blip r:embed="rId4"/>
           <a:stretch>
             <a:fillRect/>
           </a:stretch>
         </p:blipFill>
         <p:spPr>
           <a:xfrm>
-            <a:off x="6288784" y="259414"/>
+            <a:off x="6362263" y="292071"/>
             <a:ext cx="5449889" cy="6406015"/>
           </a:xfrm>
           <a:prstGeom prst="rect">
@@ -22466,7 +22831,7 @@
           <p:nvPr/>
         </p:nvPicPr>
         <p:blipFill>
-          <a:blip r:embed="rId4"/>
+          <a:blip r:embed="rId5"/>
           <a:stretch>
             <a:fillRect/>
           </a:stretch>
@@ -22475,36 +22840,6 @@
           <a:xfrm>
             <a:off x="178319" y="2014164"/>
             <a:ext cx="6014951" cy="4584422"/>
-          </a:xfrm>
-          <a:prstGeom prst="rect">
-            <a:avLst/>
-          </a:prstGeom>
-        </p:spPr>
-      </p:pic>
-      <p:pic>
-        <p:nvPicPr>
-          <p:cNvPr id="16" name="Imagen 15" descr="Gráfico, Gráfico de superficie&#10;&#10;Descripción generada automáticamente">
-            <a:extLst>
-              <a:ext uri="{FF2B5EF4-FFF2-40B4-BE49-F238E27FC236}">
-                <a16:creationId xmlns:a16="http://schemas.microsoft.com/office/drawing/2014/main" id="{7B05938E-83F4-4567-8A0F-6F1F833852EB}"/>
-              </a:ext>
-            </a:extLst>
-          </p:cNvPr>
-          <p:cNvPicPr>
-            <a:picLocks noChangeAspect="1"/>
-          </p:cNvPicPr>
-          <p:nvPr/>
-        </p:nvPicPr>
-        <p:blipFill>
-          <a:blip r:embed="rId5"/>
-          <a:stretch>
-            <a:fillRect/>
-          </a:stretch>
-        </p:blipFill>
-        <p:spPr>
-          <a:xfrm>
-            <a:off x="6662057" y="4508046"/>
-            <a:ext cx="4191000" cy="3181350"/>
           </a:xfrm>
           <a:prstGeom prst="rect">
             <a:avLst/>
@@ -22775,7 +23110,7 @@
                             </p:stCondLst>
                             <p:childTnLst>
                               <p:par>
-                                <p:cTn id="25" presetID="1" presetClass="exit" presetSubtype="0" fill="hold" nodeType="clickEffect">
+                                <p:cTn id="25" presetID="1" presetClass="entr" presetSubtype="0" fill="hold" nodeType="clickEffect">
                                   <p:stCondLst>
                                     <p:cond delay="0"/>
                                   </p:stCondLst>
@@ -22783,51 +23118,6 @@
                                     <p:set>
                                       <p:cBhvr>
                                         <p:cTn id="26" dur="1" fill="hold">
-                                          <p:stCondLst>
-                                            <p:cond delay="0"/>
-                                          </p:stCondLst>
-                                        </p:cTn>
-                                        <p:tgtEl>
-                                          <p:spTgt spid="16"/>
-                                        </p:tgtEl>
-                                        <p:attrNameLst>
-                                          <p:attrName>style.visibility</p:attrName>
-                                        </p:attrNameLst>
-                                      </p:cBhvr>
-                                      <p:to>
-                                        <p:strVal val="hidden"/>
-                                      </p:to>
-                                    </p:set>
-                                  </p:childTnLst>
-                                </p:cTn>
-                              </p:par>
-                            </p:childTnLst>
-                          </p:cTn>
-                        </p:par>
-                      </p:childTnLst>
-                    </p:cTn>
-                  </p:par>
-                  <p:par>
-                    <p:cTn id="27" fill="hold">
-                      <p:stCondLst>
-                        <p:cond delay="indefinite"/>
-                      </p:stCondLst>
-                      <p:childTnLst>
-                        <p:par>
-                          <p:cTn id="28" fill="hold">
-                            <p:stCondLst>
-                              <p:cond delay="0"/>
-                            </p:stCondLst>
-                            <p:childTnLst>
-                              <p:par>
-                                <p:cTn id="29" presetID="1" presetClass="entr" presetSubtype="0" fill="hold" nodeType="clickEffect">
-                                  <p:stCondLst>
-                                    <p:cond delay="0"/>
-                                  </p:stCondLst>
-                                  <p:childTnLst>
-                                    <p:set>
-                                      <p:cBhvr>
-                                        <p:cTn id="30" dur="1" fill="hold">
                                           <p:stCondLst>
                                             <p:cond delay="0"/>
                                           </p:stCondLst>
@@ -23959,6 +24249,15 @@
 </file>
 
 <file path=customXml/item1.xml><?xml version="1.0" encoding="utf-8"?>
+<p:properties xmlns:p="http://schemas.microsoft.com/office/2006/metadata/properties" xmlns:xsi="http://www.w3.org/2001/XMLSchema-instance" xmlns:pc="http://schemas.microsoft.com/office/infopath/2007/PartnerControls">
+  <documentManagement>
+    <Status xmlns="71af3243-3dd4-4a8d-8c0d-dd76da1f02a5">Not started</Status>
+    <MediaServiceKeyPoints xmlns="71af3243-3dd4-4a8d-8c0d-dd76da1f02a5" xsi:nil="true"/>
+  </documentManagement>
+</p:properties>
+</file>
+
+<file path=customXml/item2.xml><?xml version="1.0" encoding="utf-8"?>
 <ct:contentTypeSchema xmlns:ct="http://schemas.microsoft.com/office/2006/metadata/contentType" xmlns:ma="http://schemas.microsoft.com/office/2006/metadata/properties/metaAttributes" ct:_="" ma:_="" ma:contentTypeName="Document" ma:contentTypeID="0x01010079F111ED35F8CC479449609E8A0923A6" ma:contentTypeVersion="12" ma:contentTypeDescription="Create a new document." ma:contentTypeScope="" ma:versionID="426e97fa315356fffbdcd9876fe988c2">
   <xsd:schema xmlns:xsd="http://www.w3.org/2001/XMLSchema" xmlns:xs="http://www.w3.org/2001/XMLSchema" xmlns:p="http://schemas.microsoft.com/office/2006/metadata/properties" xmlns:ns2="71af3243-3dd4-4a8d-8c0d-dd76da1f02a5" xmlns:ns3="16c05727-aa75-4e4a-9b5f-8a80a1165891" targetNamespace="http://schemas.microsoft.com/office/2006/metadata/properties" ma:root="true" ma:fieldsID="14b8f0def80e6d70ce3def20c90759ae" ns2:_="" ns3:_="">
     <xsd:import namespace="71af3243-3dd4-4a8d-8c0d-dd76da1f02a5"/>
@@ -24179,15 +24478,6 @@
 </ct:contentTypeSchema>
 </file>
 
-<file path=customXml/item2.xml><?xml version="1.0" encoding="utf-8"?>
-<p:properties xmlns:p="http://schemas.microsoft.com/office/2006/metadata/properties" xmlns:xsi="http://www.w3.org/2001/XMLSchema-instance" xmlns:pc="http://schemas.microsoft.com/office/infopath/2007/PartnerControls">
-  <documentManagement>
-    <Status xmlns="71af3243-3dd4-4a8d-8c0d-dd76da1f02a5">Not started</Status>
-    <MediaServiceKeyPoints xmlns="71af3243-3dd4-4a8d-8c0d-dd76da1f02a5" xsi:nil="true"/>
-  </documentManagement>
-</p:properties>
-</file>
-
 <file path=customXml/item3.xml><?xml version="1.0" encoding="utf-8"?>
 <?mso-contentType ?>
 <FormTemplates xmlns="http://schemas.microsoft.com/sharepoint/v3/contenttype/forms">
@@ -24198,6 +24488,16 @@
 </file>
 
 <file path=customXml/itemProps1.xml><?xml version="1.0" encoding="utf-8"?>
+<ds:datastoreItem xmlns:ds="http://schemas.openxmlformats.org/officeDocument/2006/customXml" ds:itemID="{B211B2B9-8CE5-4E5A-B70F-6B056FE844E8}">
+  <ds:schemaRefs>
+    <ds:schemaRef ds:uri="http://schemas.microsoft.com/office/2006/metadata/properties"/>
+    <ds:schemaRef ds:uri="http://schemas.microsoft.com/office/infopath/2007/PartnerControls"/>
+    <ds:schemaRef ds:uri="71af3243-3dd4-4a8d-8c0d-dd76da1f02a5"/>
+  </ds:schemaRefs>
+</ds:datastoreItem>
+</file>
+
+<file path=customXml/itemProps2.xml><?xml version="1.0" encoding="utf-8"?>
 <ds:datastoreItem xmlns:ds="http://schemas.openxmlformats.org/officeDocument/2006/customXml" ds:itemID="{5055BC56-8FA3-435B-ACDD-0E8E6241EF63}">
   <ds:schemaRefs>
     <ds:schemaRef ds:uri="http://schemas.microsoft.com/office/2006/metadata/contentType"/>
@@ -24216,16 +24516,6 @@
 </ds:datastoreItem>
 </file>
 
-<file path=customXml/itemProps2.xml><?xml version="1.0" encoding="utf-8"?>
-<ds:datastoreItem xmlns:ds="http://schemas.openxmlformats.org/officeDocument/2006/customXml" ds:itemID="{B211B2B9-8CE5-4E5A-B70F-6B056FE844E8}">
-  <ds:schemaRefs>
-    <ds:schemaRef ds:uri="http://schemas.microsoft.com/office/2006/metadata/properties"/>
-    <ds:schemaRef ds:uri="http://schemas.microsoft.com/office/infopath/2007/PartnerControls"/>
-    <ds:schemaRef ds:uri="71af3243-3dd4-4a8d-8c0d-dd76da1f02a5"/>
-  </ds:schemaRefs>
-</ds:datastoreItem>
-</file>
-
 <file path=customXml/itemProps3.xml><?xml version="1.0" encoding="utf-8"?>
 <ds:datastoreItem xmlns:ds="http://schemas.openxmlformats.org/officeDocument/2006/customXml" ds:itemID="{466BA265-3C9C-41FF-80C6-61A7F961C0DC}">
   <ds:schemaRefs>

</xml_diff>